<commit_message>
Added documentation and fixed some issues.
</commit_message>
<xml_diff>
--- a/eapli.base/docs/PDS_do_Projeto_SPRINT_C.pptx
+++ b/eapli.base/docs/PDS_do_Projeto_SPRINT_C.pptx
@@ -6920,34 +6920,37 @@
           <a:lstStyle/>
           <a:p>
             <a:r>
-              <a:rPr lang="pt-PT"/>
-              <a:t>Members:</a:t>
+              <a:rPr lang="pt-PT" dirty="0" err="1"/>
+              <a:t>Members</a:t>
+            </a:r>
+            <a:r>
+              <a:rPr lang="pt-PT" dirty="0"/>
+              <a:t>:</a:t>
             </a:r>
           </a:p>
           <a:p>
             <a:r>
-              <a:rPr lang="pt-PT"/>
-              <a:t>João Beires </a:t>
+              <a:rPr lang="pt-PT" dirty="0"/>
+              <a:t>João Beires nº 1190718</a:t>
             </a:r>
           </a:p>
           <a:p>
             <a:r>
-              <a:rPr lang="pt-PT"/>
-              <a:t>José Soares</a:t>
+              <a:rPr lang="pt-PT" dirty="0"/>
+              <a:t>José Soares nº 1190782</a:t>
             </a:r>
           </a:p>
           <a:p>
             <a:r>
-              <a:rPr lang="pt-PT"/>
-              <a:t>José Maia</a:t>
+              <a:rPr lang="pt-PT" dirty="0"/>
+              <a:t>José Maia nº 1191419</a:t>
             </a:r>
           </a:p>
           <a:p>
             <a:r>
-              <a:rPr lang="pt-PT"/>
-              <a:t>Lourenço Melo</a:t>
-            </a:r>
-            <a:endParaRPr lang="pt-PT" dirty="0"/>
+              <a:rPr lang="pt-PT" dirty="0"/>
+              <a:t>Lourenço Melo nº 1190811</a:t>
+            </a:r>
           </a:p>
         </p:txBody>
       </p:sp>

</xml_diff>